<commit_message>
Pretty neat definition of problem statement in the second slide.
</commit_message>
<xml_diff>
--- a/largeDistributionModelStudies_aryan_ritwajeet_jha.pptx
+++ b/largeDistributionModelStudies_aryan_ritwajeet_jha.pptx
@@ -121,7 +121,7 @@
 <file path=ppt/revisionInfo.xml><?xml version="1.0" encoding="utf-8"?>
 <p1510:revInfo xmlns:a="http://schemas.openxmlformats.org/drawingml/2006/main" xmlns:r="http://schemas.openxmlformats.org/officeDocument/2006/relationships" xmlns:p1510="http://schemas.microsoft.com/office/powerpoint/2015/10/main">
   <p1510:revLst>
-    <p1510:client id="{224A6229-FC49-44B0-A89B-24EF4DC41BAF}" v="40" dt="2023-07-10T21:15:35.813"/>
+    <p1510:client id="{224A6229-FC49-44B0-A89B-24EF4DC41BAF}" v="542" dt="2023-07-10T21:55:06.071"/>
   </p1510:revLst>
 </p1510:revInfo>
 </file>
@@ -131,12 +131,12 @@
   <pc:docChgLst>
     <pc:chgData name="Jha, Aryan Ritwajeet" userId="2aad577e-539b-449b-83a6-8d411f484b4d" providerId="ADAL" clId="{224A6229-FC49-44B0-A89B-24EF4DC41BAF}"/>
     <pc:docChg chg="undo custSel addSld delSld modSld">
-      <pc:chgData name="Jha, Aryan Ritwajeet" userId="2aad577e-539b-449b-83a6-8d411f484b4d" providerId="ADAL" clId="{224A6229-FC49-44B0-A89B-24EF4DC41BAF}" dt="2023-07-10T21:18:12.154" v="405" actId="20577"/>
+      <pc:chgData name="Jha, Aryan Ritwajeet" userId="2aad577e-539b-449b-83a6-8d411f484b4d" providerId="ADAL" clId="{224A6229-FC49-44B0-A89B-24EF4DC41BAF}" dt="2023-07-10T21:55:06.071" v="1892" actId="20577"/>
       <pc:docMkLst>
         <pc:docMk/>
       </pc:docMkLst>
       <pc:sldChg chg="addSp delSp modSp mod delAnim modAnim">
-        <pc:chgData name="Jha, Aryan Ritwajeet" userId="2aad577e-539b-449b-83a6-8d411f484b4d" providerId="ADAL" clId="{224A6229-FC49-44B0-A89B-24EF4DC41BAF}" dt="2023-07-10T21:18:12.154" v="405" actId="20577"/>
+        <pc:chgData name="Jha, Aryan Ritwajeet" userId="2aad577e-539b-449b-83a6-8d411f484b4d" providerId="ADAL" clId="{224A6229-FC49-44B0-A89B-24EF4DC41BAF}" dt="2023-07-10T21:45:09.977" v="1662" actId="20577"/>
         <pc:sldMkLst>
           <pc:docMk/>
           <pc:sldMk cId="2467290404" sldId="257"/>
@@ -230,7 +230,7 @@
           </ac:spMkLst>
         </pc:spChg>
         <pc:spChg chg="mod topLvl">
-          <ac:chgData name="Jha, Aryan Ritwajeet" userId="2aad577e-539b-449b-83a6-8d411f484b4d" providerId="ADAL" clId="{224A6229-FC49-44B0-A89B-24EF4DC41BAF}" dt="2023-07-10T21:03:50.985" v="70" actId="164"/>
+          <ac:chgData name="Jha, Aryan Ritwajeet" userId="2aad577e-539b-449b-83a6-8d411f484b4d" providerId="ADAL" clId="{224A6229-FC49-44B0-A89B-24EF4DC41BAF}" dt="2023-07-10T21:45:09.977" v="1662" actId="20577"/>
           <ac:spMkLst>
             <pc:docMk/>
             <pc:sldMk cId="2467290404" sldId="257"/>
@@ -926,7 +926,7 @@
           </ac:grpSpMkLst>
         </pc:grpChg>
         <pc:grpChg chg="add mod">
-          <ac:chgData name="Jha, Aryan Ritwajeet" userId="2aad577e-539b-449b-83a6-8d411f484b4d" providerId="ADAL" clId="{224A6229-FC49-44B0-A89B-24EF4DC41BAF}" dt="2023-07-10T21:03:54.938" v="71" actId="1076"/>
+          <ac:chgData name="Jha, Aryan Ritwajeet" userId="2aad577e-539b-449b-83a6-8d411f484b4d" providerId="ADAL" clId="{224A6229-FC49-44B0-A89B-24EF4DC41BAF}" dt="2023-07-10T21:44:24.299" v="1647" actId="1076"/>
           <ac:grpSpMkLst>
             <pc:docMk/>
             <pc:sldMk cId="2467290404" sldId="257"/>
@@ -1331,8 +1331,8 @@
           <pc:sldMk cId="3369036452" sldId="260"/>
         </pc:sldMkLst>
       </pc:sldChg>
-      <pc:sldChg chg="addSp modSp new mod setBg">
-        <pc:chgData name="Jha, Aryan Ritwajeet" userId="2aad577e-539b-449b-83a6-8d411f484b4d" providerId="ADAL" clId="{224A6229-FC49-44B0-A89B-24EF4DC41BAF}" dt="2023-07-10T21:14:09.001" v="116"/>
+      <pc:sldChg chg="addSp delSp modSp new mod setBg">
+        <pc:chgData name="Jha, Aryan Ritwajeet" userId="2aad577e-539b-449b-83a6-8d411f484b4d" providerId="ADAL" clId="{224A6229-FC49-44B0-A89B-24EF4DC41BAF}" dt="2023-07-10T21:55:06.071" v="1892" actId="20577"/>
         <pc:sldMkLst>
           <pc:docMk/>
           <pc:sldMk cId="1146489394" sldId="261"/>
@@ -1409,38 +1409,174 @@
             <ac:spMk id="14" creationId="{B43505AE-7A89-5CCE-3B09-E5A06F4F11E1}"/>
           </ac:spMkLst>
         </pc:spChg>
-        <pc:grpChg chg="add mod">
-          <ac:chgData name="Jha, Aryan Ritwajeet" userId="2aad577e-539b-449b-83a6-8d411f484b4d" providerId="ADAL" clId="{224A6229-FC49-44B0-A89B-24EF4DC41BAF}" dt="2023-07-10T21:14:09.001" v="116"/>
+        <pc:spChg chg="add mod">
+          <ac:chgData name="Jha, Aryan Ritwajeet" userId="2aad577e-539b-449b-83a6-8d411f484b4d" providerId="ADAL" clId="{224A6229-FC49-44B0-A89B-24EF4DC41BAF}" dt="2023-07-10T21:24:10.977" v="455" actId="403"/>
+          <ac:spMkLst>
+            <pc:docMk/>
+            <pc:sldMk cId="1146489394" sldId="261"/>
+            <ac:spMk id="15" creationId="{08AFBCA6-3630-5A60-2DA0-F4DBDDB142B1}"/>
+          </ac:spMkLst>
+        </pc:spChg>
+        <pc:spChg chg="add mod">
+          <ac:chgData name="Jha, Aryan Ritwajeet" userId="2aad577e-539b-449b-83a6-8d411f484b4d" providerId="ADAL" clId="{224A6229-FC49-44B0-A89B-24EF4DC41BAF}" dt="2023-07-10T21:55:06.071" v="1892" actId="20577"/>
+          <ac:spMkLst>
+            <pc:docMk/>
+            <pc:sldMk cId="1146489394" sldId="261"/>
+            <ac:spMk id="16" creationId="{63991ACF-C27F-7188-A451-B28D3C2ED4A6}"/>
+          </ac:spMkLst>
+        </pc:spChg>
+        <pc:spChg chg="add mod">
+          <ac:chgData name="Jha, Aryan Ritwajeet" userId="2aad577e-539b-449b-83a6-8d411f484b4d" providerId="ADAL" clId="{224A6229-FC49-44B0-A89B-24EF4DC41BAF}" dt="2023-07-10T21:27:25.333" v="588" actId="164"/>
+          <ac:spMkLst>
+            <pc:docMk/>
+            <pc:sldMk cId="1146489394" sldId="261"/>
+            <ac:spMk id="19" creationId="{6BCCF6CA-B34E-A367-CCBA-3B4185ABBF22}"/>
+          </ac:spMkLst>
+        </pc:spChg>
+        <pc:spChg chg="mod">
+          <ac:chgData name="Jha, Aryan Ritwajeet" userId="2aad577e-539b-449b-83a6-8d411f484b4d" providerId="ADAL" clId="{224A6229-FC49-44B0-A89B-24EF4DC41BAF}" dt="2023-07-10T21:44:57.446" v="1658"/>
+          <ac:spMkLst>
+            <pc:docMk/>
+            <pc:sldMk cId="1146489394" sldId="261"/>
+            <ac:spMk id="22" creationId="{63CA5B54-C164-C04F-03EE-FE168455F14E}"/>
+          </ac:spMkLst>
+        </pc:spChg>
+        <pc:spChg chg="mod">
+          <ac:chgData name="Jha, Aryan Ritwajeet" userId="2aad577e-539b-449b-83a6-8d411f484b4d" providerId="ADAL" clId="{224A6229-FC49-44B0-A89B-24EF4DC41BAF}" dt="2023-07-10T21:45:06.086" v="1661" actId="20577"/>
+          <ac:spMkLst>
+            <pc:docMk/>
+            <pc:sldMk cId="1146489394" sldId="261"/>
+            <ac:spMk id="23" creationId="{79C98084-0850-DB2B-624F-DA651B3501A6}"/>
+          </ac:spMkLst>
+        </pc:spChg>
+        <pc:spChg chg="mod">
+          <ac:chgData name="Jha, Aryan Ritwajeet" userId="2aad577e-539b-449b-83a6-8d411f484b4d" providerId="ADAL" clId="{224A6229-FC49-44B0-A89B-24EF4DC41BAF}" dt="2023-07-10T21:44:57.446" v="1658"/>
+          <ac:spMkLst>
+            <pc:docMk/>
+            <pc:sldMk cId="1146489394" sldId="261"/>
+            <ac:spMk id="25" creationId="{DF26108A-8943-9514-2DFE-E8B0C658128A}"/>
+          </ac:spMkLst>
+        </pc:spChg>
+        <pc:spChg chg="mod">
+          <ac:chgData name="Jha, Aryan Ritwajeet" userId="2aad577e-539b-449b-83a6-8d411f484b4d" providerId="ADAL" clId="{224A6229-FC49-44B0-A89B-24EF4DC41BAF}" dt="2023-07-10T21:44:57.446" v="1658"/>
+          <ac:spMkLst>
+            <pc:docMk/>
+            <pc:sldMk cId="1146489394" sldId="261"/>
+            <ac:spMk id="26" creationId="{FD22E970-3933-7892-6A82-76AA057C52CD}"/>
+          </ac:spMkLst>
+        </pc:spChg>
+        <pc:spChg chg="mod">
+          <ac:chgData name="Jha, Aryan Ritwajeet" userId="2aad577e-539b-449b-83a6-8d411f484b4d" providerId="ADAL" clId="{224A6229-FC49-44B0-A89B-24EF4DC41BAF}" dt="2023-07-10T21:44:57.446" v="1658"/>
+          <ac:spMkLst>
+            <pc:docMk/>
+            <pc:sldMk cId="1146489394" sldId="261"/>
+            <ac:spMk id="28" creationId="{1FACBE21-2BC8-4D5B-DA6F-18A6CA0E3C31}"/>
+          </ac:spMkLst>
+        </pc:spChg>
+        <pc:spChg chg="mod">
+          <ac:chgData name="Jha, Aryan Ritwajeet" userId="2aad577e-539b-449b-83a6-8d411f484b4d" providerId="ADAL" clId="{224A6229-FC49-44B0-A89B-24EF4DC41BAF}" dt="2023-07-10T21:44:57.446" v="1658"/>
+          <ac:spMkLst>
+            <pc:docMk/>
+            <pc:sldMk cId="1146489394" sldId="261"/>
+            <ac:spMk id="29" creationId="{91ECE067-7910-A4D5-6BDE-DD3808E50C3E}"/>
+          </ac:spMkLst>
+        </pc:spChg>
+        <pc:spChg chg="mod">
+          <ac:chgData name="Jha, Aryan Ritwajeet" userId="2aad577e-539b-449b-83a6-8d411f484b4d" providerId="ADAL" clId="{224A6229-FC49-44B0-A89B-24EF4DC41BAF}" dt="2023-07-10T21:44:57.446" v="1658"/>
+          <ac:spMkLst>
+            <pc:docMk/>
+            <pc:sldMk cId="1146489394" sldId="261"/>
+            <ac:spMk id="31" creationId="{D5B596BD-B6B1-BE54-F24C-611444701E4F}"/>
+          </ac:spMkLst>
+        </pc:spChg>
+        <pc:spChg chg="mod">
+          <ac:chgData name="Jha, Aryan Ritwajeet" userId="2aad577e-539b-449b-83a6-8d411f484b4d" providerId="ADAL" clId="{224A6229-FC49-44B0-A89B-24EF4DC41BAF}" dt="2023-07-10T21:44:57.446" v="1658"/>
+          <ac:spMkLst>
+            <pc:docMk/>
+            <pc:sldMk cId="1146489394" sldId="261"/>
+            <ac:spMk id="32" creationId="{437E8111-CAE1-3230-FF6C-2C8256475FF7}"/>
+          </ac:spMkLst>
+        </pc:spChg>
+        <pc:grpChg chg="add del mod">
+          <ac:chgData name="Jha, Aryan Ritwajeet" userId="2aad577e-539b-449b-83a6-8d411f484b4d" providerId="ADAL" clId="{224A6229-FC49-44B0-A89B-24EF4DC41BAF}" dt="2023-07-10T21:44:55.093" v="1657" actId="478"/>
           <ac:grpSpMkLst>
             <pc:docMk/>
             <pc:sldMk cId="1146489394" sldId="261"/>
             <ac:grpSpMk id="3" creationId="{C2895B56-73D7-814B-8B10-701AA4AB75AF}"/>
           </ac:grpSpMkLst>
         </pc:grpChg>
-        <pc:grpChg chg="add mod">
-          <ac:chgData name="Jha, Aryan Ritwajeet" userId="2aad577e-539b-449b-83a6-8d411f484b4d" providerId="ADAL" clId="{224A6229-FC49-44B0-A89B-24EF4DC41BAF}" dt="2023-07-10T21:14:09.001" v="116"/>
+        <pc:grpChg chg="add del mod">
+          <ac:chgData name="Jha, Aryan Ritwajeet" userId="2aad577e-539b-449b-83a6-8d411f484b4d" providerId="ADAL" clId="{224A6229-FC49-44B0-A89B-24EF4DC41BAF}" dt="2023-07-10T21:44:55.093" v="1657" actId="478"/>
           <ac:grpSpMkLst>
             <pc:docMk/>
             <pc:sldMk cId="1146489394" sldId="261"/>
             <ac:grpSpMk id="6" creationId="{913CC6DF-03C3-3BD8-0374-C0352FBAB705}"/>
           </ac:grpSpMkLst>
         </pc:grpChg>
-        <pc:grpChg chg="add mod">
-          <ac:chgData name="Jha, Aryan Ritwajeet" userId="2aad577e-539b-449b-83a6-8d411f484b4d" providerId="ADAL" clId="{224A6229-FC49-44B0-A89B-24EF4DC41BAF}" dt="2023-07-10T21:14:09.001" v="116"/>
+        <pc:grpChg chg="add del mod">
+          <ac:chgData name="Jha, Aryan Ritwajeet" userId="2aad577e-539b-449b-83a6-8d411f484b4d" providerId="ADAL" clId="{224A6229-FC49-44B0-A89B-24EF4DC41BAF}" dt="2023-07-10T21:44:55.093" v="1657" actId="478"/>
           <ac:grpSpMkLst>
             <pc:docMk/>
             <pc:sldMk cId="1146489394" sldId="261"/>
             <ac:grpSpMk id="9" creationId="{6588709F-D075-4438-19F3-9758A9489D68}"/>
           </ac:grpSpMkLst>
         </pc:grpChg>
-        <pc:grpChg chg="add mod">
-          <ac:chgData name="Jha, Aryan Ritwajeet" userId="2aad577e-539b-449b-83a6-8d411f484b4d" providerId="ADAL" clId="{224A6229-FC49-44B0-A89B-24EF4DC41BAF}" dt="2023-07-10T21:14:09.001" v="116"/>
+        <pc:grpChg chg="add del mod">
+          <ac:chgData name="Jha, Aryan Ritwajeet" userId="2aad577e-539b-449b-83a6-8d411f484b4d" providerId="ADAL" clId="{224A6229-FC49-44B0-A89B-24EF4DC41BAF}" dt="2023-07-10T21:44:55.093" v="1657" actId="478"/>
           <ac:grpSpMkLst>
             <pc:docMk/>
             <pc:sldMk cId="1146489394" sldId="261"/>
             <ac:grpSpMk id="12" creationId="{817A9E87-B46D-F4D7-617E-8EFD39216579}"/>
           </ac:grpSpMkLst>
         </pc:grpChg>
+        <pc:grpChg chg="add mod">
+          <ac:chgData name="Jha, Aryan Ritwajeet" userId="2aad577e-539b-449b-83a6-8d411f484b4d" providerId="ADAL" clId="{224A6229-FC49-44B0-A89B-24EF4DC41BAF}" dt="2023-07-10T21:27:25.333" v="588" actId="164"/>
+          <ac:grpSpMkLst>
+            <pc:docMk/>
+            <pc:sldMk cId="1146489394" sldId="261"/>
+            <ac:grpSpMk id="20" creationId="{60BFAD4F-3526-3206-C424-7C5B1F0F6FB7}"/>
+          </ac:grpSpMkLst>
+        </pc:grpChg>
+        <pc:grpChg chg="add mod">
+          <ac:chgData name="Jha, Aryan Ritwajeet" userId="2aad577e-539b-449b-83a6-8d411f484b4d" providerId="ADAL" clId="{224A6229-FC49-44B0-A89B-24EF4DC41BAF}" dt="2023-07-10T21:44:57.446" v="1658"/>
+          <ac:grpSpMkLst>
+            <pc:docMk/>
+            <pc:sldMk cId="1146489394" sldId="261"/>
+            <ac:grpSpMk id="21" creationId="{F38E01B3-56AD-6626-1B6B-419128D70B0B}"/>
+          </ac:grpSpMkLst>
+        </pc:grpChg>
+        <pc:grpChg chg="add mod">
+          <ac:chgData name="Jha, Aryan Ritwajeet" userId="2aad577e-539b-449b-83a6-8d411f484b4d" providerId="ADAL" clId="{224A6229-FC49-44B0-A89B-24EF4DC41BAF}" dt="2023-07-10T21:44:57.446" v="1658"/>
+          <ac:grpSpMkLst>
+            <pc:docMk/>
+            <pc:sldMk cId="1146489394" sldId="261"/>
+            <ac:grpSpMk id="24" creationId="{9DDEF095-B052-7B61-49F1-0AD58E757BE4}"/>
+          </ac:grpSpMkLst>
+        </pc:grpChg>
+        <pc:grpChg chg="add mod">
+          <ac:chgData name="Jha, Aryan Ritwajeet" userId="2aad577e-539b-449b-83a6-8d411f484b4d" providerId="ADAL" clId="{224A6229-FC49-44B0-A89B-24EF4DC41BAF}" dt="2023-07-10T21:44:57.446" v="1658"/>
+          <ac:grpSpMkLst>
+            <pc:docMk/>
+            <pc:sldMk cId="1146489394" sldId="261"/>
+            <ac:grpSpMk id="27" creationId="{8F26E5BF-5545-E1B0-BE06-8206AC874C9E}"/>
+          </ac:grpSpMkLst>
+        </pc:grpChg>
+        <pc:grpChg chg="add mod">
+          <ac:chgData name="Jha, Aryan Ritwajeet" userId="2aad577e-539b-449b-83a6-8d411f484b4d" providerId="ADAL" clId="{224A6229-FC49-44B0-A89B-24EF4DC41BAF}" dt="2023-07-10T21:44:57.446" v="1658"/>
+          <ac:grpSpMkLst>
+            <pc:docMk/>
+            <pc:sldMk cId="1146489394" sldId="261"/>
+            <ac:grpSpMk id="30" creationId="{318719A0-5300-3D9A-0491-61BF2040D1C9}"/>
+          </ac:grpSpMkLst>
+        </pc:grpChg>
+        <pc:picChg chg="add mod">
+          <ac:chgData name="Jha, Aryan Ritwajeet" userId="2aad577e-539b-449b-83a6-8d411f484b4d" providerId="ADAL" clId="{224A6229-FC49-44B0-A89B-24EF4DC41BAF}" dt="2023-07-10T21:27:25.333" v="588" actId="164"/>
+          <ac:picMkLst>
+            <pc:docMk/>
+            <pc:sldMk cId="1146489394" sldId="261"/>
+            <ac:picMk id="18" creationId="{1C980944-026F-5C5F-7384-2FD76A0F489C}"/>
+          </ac:picMkLst>
+        </pc:picChg>
       </pc:sldChg>
       <pc:sldChg chg="addSp modSp new setBg">
         <pc:chgData name="Jha, Aryan Ritwajeet" userId="2aad577e-539b-449b-83a6-8d411f484b4d" providerId="ADAL" clId="{224A6229-FC49-44B0-A89B-24EF4DC41BAF}" dt="2023-07-10T21:14:11.399" v="117"/>
@@ -5151,25 +5287,7 @@
                   </a:solidFill>
                   <a:latin typeface="Tw Cen MT" panose="020B0602020104020603" pitchFamily="34" charset="0"/>
                 </a:rPr>
-                <a:t>Observation of the effect of change in parameter values on Distributed OPF Simulations for the synthetic 1k and 10k </a:t>
-              </a:r>
-              <a:r>
-                <a:rPr lang="en-US" sz="2000">
-                  <a:solidFill>
-                    <a:srgbClr val="FACDB0"/>
-                  </a:solidFill>
-                  <a:latin typeface="Tw Cen MT" panose="020B0602020104020603" pitchFamily="34" charset="0"/>
-                </a:rPr>
-                <a:t>Power Distribution networks</a:t>
-              </a:r>
-              <a:r>
-                <a:rPr lang="en-US" sz="2000" dirty="0">
-                  <a:solidFill>
-                    <a:srgbClr val="FACDB0"/>
-                  </a:solidFill>
-                  <a:latin typeface="Tw Cen MT" panose="020B0602020104020603" pitchFamily="34" charset="0"/>
-                </a:rPr>
-                <a:t>.</a:t>
+                <a:t>Observation of the effect of change in parameter values on Distributed OPF Simulations for the synthetic 1k and 10k Power Distribution networks.</a:t>
               </a:r>
             </a:p>
           </p:txBody>
@@ -5190,9 +5308,9 @@
         <p:grpSpPr>
           <a:xfrm>
             <a:off x="0" y="0"/>
-            <a:ext cx="731706" cy="584776"/>
+            <a:ext cx="731706" cy="541243"/>
             <a:chOff x="1782895" y="1047749"/>
-            <a:chExt cx="731706" cy="584776"/>
+            <a:chExt cx="731706" cy="541243"/>
           </a:xfrm>
         </p:grpSpPr>
         <p:sp>
@@ -5268,8 +5386,8 @@
           </p:nvSpPr>
           <p:spPr>
             <a:xfrm>
-              <a:off x="1937895" y="1047750"/>
-              <a:ext cx="386206" cy="584775"/>
+              <a:off x="1864298" y="1157528"/>
+              <a:ext cx="533400" cy="307777"/>
             </a:xfrm>
             <a:prstGeom prst="rect">
               <a:avLst/>
@@ -5287,13 +5405,13 @@
             <a:p>
               <a:pPr algn="ctr"/>
               <a:r>
-                <a:rPr lang="en-US" sz="3200" b="1" dirty="0">
+                <a:rPr lang="en-US" sz="1400" b="1" dirty="0">
                   <a:solidFill>
                     <a:schemeClr val="bg1"/>
                   </a:solidFill>
                   <a:latin typeface="DAGGERSQUARE" pitchFamily="50" charset="0"/>
                 </a:rPr>
-                <a:t>D</a:t>
+                <a:t>Prob</a:t>
               </a:r>
             </a:p>
           </p:txBody>
@@ -5803,12 +5921,863 @@
           </a:p>
         </p:txBody>
       </p:sp>
+      <p:sp>
+        <p:nvSpPr>
+          <p:cNvPr id="15" name="TextBox 14">
+            <a:extLst>
+              <a:ext uri="{FF2B5EF4-FFF2-40B4-BE49-F238E27FC236}">
+                <a16:creationId xmlns:a16="http://schemas.microsoft.com/office/drawing/2014/main" id="{08AFBCA6-3630-5A60-2DA0-F4DBDDB142B1}"/>
+              </a:ext>
+            </a:extLst>
+          </p:cNvPr>
+          <p:cNvSpPr txBox="1"/>
+          <p:nvPr/>
+        </p:nvSpPr>
+        <p:spPr>
+          <a:xfrm>
+            <a:off x="1714500" y="541244"/>
+            <a:ext cx="8915400" cy="707886"/>
+          </a:xfrm>
+          <a:prstGeom prst="rect">
+            <a:avLst/>
+          </a:prstGeom>
+          <a:noFill/>
+        </p:spPr>
+        <p:txBody>
+          <a:bodyPr wrap="square" rtlCol="0">
+            <a:spAutoFit/>
+          </a:bodyPr>
+          <a:lstStyle/>
+          <a:p>
+            <a:r>
+              <a:rPr lang="en-US" sz="4000" dirty="0">
+                <a:latin typeface="Tw Cen MT" panose="020B0602020104020603" pitchFamily="34" charset="0"/>
+              </a:rPr>
+              <a:t>Problem Statement</a:t>
+            </a:r>
+          </a:p>
+        </p:txBody>
+      </p:sp>
+      <mc:AlternateContent xmlns:mc="http://schemas.openxmlformats.org/markup-compatibility/2006">
+        <mc:Choice xmlns:a14="http://schemas.microsoft.com/office/drawing/2010/main" Requires="a14">
+          <p:sp>
+            <p:nvSpPr>
+              <p:cNvPr id="16" name="TextBox 15">
+                <a:extLst>
+                  <a:ext uri="{FF2B5EF4-FFF2-40B4-BE49-F238E27FC236}">
+                    <a16:creationId xmlns:a16="http://schemas.microsoft.com/office/drawing/2014/main" id="{63991ACF-C27F-7188-A451-B28D3C2ED4A6}"/>
+                  </a:ext>
+                </a:extLst>
+              </p:cNvPr>
+              <p:cNvSpPr txBox="1"/>
+              <p:nvPr/>
+            </p:nvSpPr>
+            <p:spPr>
+              <a:xfrm>
+                <a:off x="1363436" y="2335728"/>
+                <a:ext cx="9939564" cy="5078313"/>
+              </a:xfrm>
+              <a:prstGeom prst="rect">
+                <a:avLst/>
+              </a:prstGeom>
+              <a:noFill/>
+            </p:spPr>
+            <p:txBody>
+              <a:bodyPr wrap="square" rtlCol="0">
+                <a:spAutoFit/>
+              </a:bodyPr>
+              <a:lstStyle/>
+              <a:p>
+                <a:r>
+                  <a:rPr lang="en-US" b="1" dirty="0">
+                    <a:latin typeface="Tw Cen MT" panose="020B0602020104020603" pitchFamily="34" charset="0"/>
+                  </a:rPr>
+                  <a:t>Given a large Power Distribution System </a:t>
+                </a:r>
+                <a14:m>
+                  <m:oMath xmlns:m="http://schemas.openxmlformats.org/officeDocument/2006/math">
+                    <m:d>
+                      <m:dPr>
+                        <m:ctrlPr>
+                          <a:rPr lang="en-US" b="0" i="1" smtClean="0">
+                            <a:latin typeface="Cambria Math" panose="02040503050406030204" pitchFamily="18" charset="0"/>
+                          </a:rPr>
+                        </m:ctrlPr>
+                      </m:dPr>
+                      <m:e>
+                        <m:r>
+                          <a:rPr lang="en-US" b="0" i="1" smtClean="0">
+                            <a:latin typeface="Cambria Math" panose="02040503050406030204" pitchFamily="18" charset="0"/>
+                          </a:rPr>
+                          <m:t>𝑁</m:t>
+                        </m:r>
+                        <m:r>
+                          <a:rPr lang="en-US" b="0" i="1" smtClean="0">
+                            <a:latin typeface="Cambria Math" panose="02040503050406030204" pitchFamily="18" charset="0"/>
+                          </a:rPr>
+                          <m:t> ~ 10,000</m:t>
+                        </m:r>
+                      </m:e>
+                    </m:d>
+                  </m:oMath>
+                </a14:m>
+                <a:r>
+                  <a:rPr lang="en-US" dirty="0">
+                    <a:latin typeface="Tw Cen MT" panose="020B0602020104020603" pitchFamily="34" charset="0"/>
+                  </a:rPr>
+                  <a:t> with:</a:t>
+                </a:r>
+              </a:p>
+              <a:p>
+                <a:pPr marL="742950" lvl="1" indent="-285750">
+                  <a:buFont typeface="Tw Cen MT" panose="020B0602020104020603" pitchFamily="34" charset="0"/>
+                  <a:buChar char="|"/>
+                </a:pPr>
+                <a:r>
+                  <a:rPr lang="en-US" dirty="0">
+                    <a:latin typeface="Tw Cen MT" panose="020B0602020104020603" pitchFamily="34" charset="0"/>
+                  </a:rPr>
+                  <a:t>Generally uniform values of branch impedances</a:t>
+                </a:r>
+              </a:p>
+              <a:p>
+                <a:pPr marL="742950" lvl="1" indent="-285750">
+                  <a:buFont typeface="Tw Cen MT" panose="020B0602020104020603" pitchFamily="34" charset="0"/>
+                  <a:buChar char="|"/>
+                </a:pPr>
+                <a:r>
+                  <a:rPr lang="en-US" dirty="0">
+                    <a:latin typeface="Tw Cen MT" panose="020B0602020104020603" pitchFamily="34" charset="0"/>
+                  </a:rPr>
+                  <a:t>Uniformly-distributed loads</a:t>
+                </a:r>
+              </a:p>
+              <a:p>
+                <a:pPr marL="742950" lvl="1" indent="-285750">
+                  <a:buFont typeface="Tw Cen MT" panose="020B0602020104020603" pitchFamily="34" charset="0"/>
+                  <a:buChar char="|"/>
+                </a:pPr>
+                <a:r>
+                  <a:rPr lang="en-US" dirty="0">
+                    <a:latin typeface="Tw Cen MT" panose="020B0602020104020603" pitchFamily="34" charset="0"/>
+                  </a:rPr>
+                  <a:t>Uniformly-distributed Distributed Energy Resources (DERs), here, solar photovoltaics (PVs) of similar ratings.</a:t>
+                </a:r>
+              </a:p>
+              <a:p>
+                <a:pPr marL="285750" indent="-285750">
+                  <a:buFont typeface="Tw Cen MT" panose="020B0602020104020603" pitchFamily="34" charset="0"/>
+                  <a:buChar char="|"/>
+                </a:pPr>
+                <a:endParaRPr lang="en-US" dirty="0">
+                  <a:latin typeface="Tw Cen MT" panose="020B0602020104020603" pitchFamily="34" charset="0"/>
+                </a:endParaRPr>
+              </a:p>
+              <a:p>
+                <a:r>
+                  <a:rPr lang="en-US" b="1" dirty="0">
+                    <a:latin typeface="Tw Cen MT" panose="020B0602020104020603" pitchFamily="34" charset="0"/>
+                  </a:rPr>
+                  <a:t>Run (D-)OPF simulations </a:t>
+                </a:r>
+                <a:r>
+                  <a:rPr lang="en-US" dirty="0">
+                    <a:latin typeface="Tw Cen MT" panose="020B0602020104020603" pitchFamily="34" charset="0"/>
+                  </a:rPr>
+                  <a:t>for different scenarios involving:</a:t>
+                </a:r>
+              </a:p>
+              <a:p>
+                <a:pPr marL="742950" lvl="1" indent="-285750">
+                  <a:buFont typeface="Tw Cen MT" panose="020B0602020104020603" pitchFamily="34" charset="0"/>
+                  <a:buChar char="|"/>
+                </a:pPr>
+                <a:r>
+                  <a:rPr lang="en-US" b="1" dirty="0">
+                    <a:latin typeface="Tw Cen MT" panose="020B0602020104020603" pitchFamily="34" charset="0"/>
+                  </a:rPr>
+                  <a:t>Variation</a:t>
+                </a:r>
+                <a:r>
+                  <a:rPr lang="en-US" dirty="0">
+                    <a:latin typeface="Tw Cen MT" panose="020B0602020104020603" pitchFamily="34" charset="0"/>
+                  </a:rPr>
+                  <a:t> </a:t>
+                </a:r>
+                <a:r>
+                  <a:rPr lang="en-US" b="1" dirty="0">
+                    <a:latin typeface="Tw Cen MT" panose="020B0602020104020603" pitchFamily="34" charset="0"/>
+                  </a:rPr>
+                  <a:t>of</a:t>
+                </a:r>
+                <a:r>
+                  <a:rPr lang="en-US" dirty="0">
+                    <a:latin typeface="Tw Cen MT" panose="020B0602020104020603" pitchFamily="34" charset="0"/>
+                  </a:rPr>
+                  <a:t> an </a:t>
+                </a:r>
+                <a:r>
+                  <a:rPr lang="en-US" b="1" dirty="0">
+                    <a:latin typeface="Tw Cen MT" panose="020B0602020104020603" pitchFamily="34" charset="0"/>
+                  </a:rPr>
+                  <a:t>independent parameter </a:t>
+                </a:r>
+                <a:r>
+                  <a:rPr lang="en-US" dirty="0">
+                    <a:latin typeface="Tw Cen MT" panose="020B0602020104020603" pitchFamily="34" charset="0"/>
+                  </a:rPr>
+                  <a:t>(say, branch impedance </a:t>
+                </a:r>
+                <a14:m>
+                  <m:oMath xmlns:m="http://schemas.openxmlformats.org/officeDocument/2006/math">
+                    <m:sSub>
+                      <m:sSubPr>
+                        <m:ctrlPr>
+                          <a:rPr lang="en-US" b="0" i="1" smtClean="0">
+                            <a:latin typeface="Cambria Math" panose="02040503050406030204" pitchFamily="18" charset="0"/>
+                          </a:rPr>
+                        </m:ctrlPr>
+                      </m:sSubPr>
+                      <m:e>
+                        <m:r>
+                          <a:rPr lang="en-US" b="0" i="1" smtClean="0">
+                            <a:latin typeface="Cambria Math" panose="02040503050406030204" pitchFamily="18" charset="0"/>
+                          </a:rPr>
+                          <m:t>𝑧</m:t>
+                        </m:r>
+                      </m:e>
+                      <m:sub>
+                        <m:r>
+                          <a:rPr lang="en-US" i="1">
+                            <a:latin typeface="Cambria Math" panose="02040503050406030204" pitchFamily="18" charset="0"/>
+                          </a:rPr>
+                          <m:t>𝑖𝑗</m:t>
+                        </m:r>
+                      </m:sub>
+                    </m:sSub>
+                    <m:r>
+                      <a:rPr lang="en-US" b="0" i="1" smtClean="0">
+                        <a:latin typeface="Cambria Math" panose="02040503050406030204" pitchFamily="18" charset="0"/>
+                      </a:rPr>
+                      <m:t>=</m:t>
+                    </m:r>
+                    <m:sSub>
+                      <m:sSubPr>
+                        <m:ctrlPr>
+                          <a:rPr lang="en-US" b="0" i="1" smtClean="0">
+                            <a:latin typeface="Cambria Math" panose="02040503050406030204" pitchFamily="18" charset="0"/>
+                          </a:rPr>
+                        </m:ctrlPr>
+                      </m:sSubPr>
+                      <m:e>
+                        <m:r>
+                          <a:rPr lang="en-US" b="0" i="1" smtClean="0">
+                            <a:latin typeface="Cambria Math" panose="02040503050406030204" pitchFamily="18" charset="0"/>
+                          </a:rPr>
+                          <m:t>𝑟</m:t>
+                        </m:r>
+                      </m:e>
+                      <m:sub>
+                        <m:r>
+                          <a:rPr lang="en-US" b="0" i="1" smtClean="0">
+                            <a:latin typeface="Cambria Math" panose="02040503050406030204" pitchFamily="18" charset="0"/>
+                          </a:rPr>
+                          <m:t>𝑖𝑗</m:t>
+                        </m:r>
+                      </m:sub>
+                    </m:sSub>
+                    <m:r>
+                      <a:rPr lang="en-US" b="0" i="1" smtClean="0">
+                        <a:latin typeface="Cambria Math" panose="02040503050406030204" pitchFamily="18" charset="0"/>
+                      </a:rPr>
+                      <m:t>+</m:t>
+                    </m:r>
+                    <m:sSub>
+                      <m:sSubPr>
+                        <m:ctrlPr>
+                          <a:rPr lang="en-US" b="0" i="1" smtClean="0">
+                            <a:latin typeface="Cambria Math" panose="02040503050406030204" pitchFamily="18" charset="0"/>
+                          </a:rPr>
+                        </m:ctrlPr>
+                      </m:sSubPr>
+                      <m:e>
+                        <m:r>
+                          <a:rPr lang="en-US" b="0" i="1" smtClean="0">
+                            <a:latin typeface="Cambria Math" panose="02040503050406030204" pitchFamily="18" charset="0"/>
+                          </a:rPr>
+                          <m:t>𝑗</m:t>
+                        </m:r>
+                      </m:e>
+                      <m:sub>
+                        <m:r>
+                          <a:rPr lang="en-US" b="0" i="1" smtClean="0">
+                            <a:latin typeface="Cambria Math" panose="02040503050406030204" pitchFamily="18" charset="0"/>
+                          </a:rPr>
+                          <m:t>𝑖𝑗</m:t>
+                        </m:r>
+                      </m:sub>
+                    </m:sSub>
+                  </m:oMath>
+                </a14:m>
+                <a:r>
+                  <a:rPr lang="en-US" dirty="0">
+                    <a:latin typeface="Tw Cen MT" panose="020B0602020104020603" pitchFamily="34" charset="0"/>
+                  </a:rPr>
+                  <a:t>)</a:t>
+                </a:r>
+              </a:p>
+              <a:p>
+                <a:pPr marL="742950" lvl="1" indent="-285750">
+                  <a:buFont typeface="Tw Cen MT" panose="020B0602020104020603" pitchFamily="34" charset="0"/>
+                  <a:buChar char="|"/>
+                </a:pPr>
+                <a:endParaRPr lang="en-US" dirty="0">
+                  <a:latin typeface="Tw Cen MT" panose="020B0602020104020603" pitchFamily="34" charset="0"/>
+                </a:endParaRPr>
+              </a:p>
+              <a:p>
+                <a:pPr marL="742950" lvl="1" indent="-285750">
+                  <a:buFont typeface="Tw Cen MT" panose="020B0602020104020603" pitchFamily="34" charset="0"/>
+                  <a:buChar char="|"/>
+                </a:pPr>
+                <a:r>
+                  <a:rPr lang="en-US" dirty="0">
+                    <a:latin typeface="Tw Cen MT" panose="020B0602020104020603" pitchFamily="34" charset="0"/>
+                  </a:rPr>
+                  <a:t>and </a:t>
+                </a:r>
+                <a:r>
+                  <a:rPr lang="en-US" b="1" dirty="0">
+                    <a:latin typeface="Tw Cen MT" panose="020B0602020104020603" pitchFamily="34" charset="0"/>
+                  </a:rPr>
+                  <a:t>observe</a:t>
+                </a:r>
+                <a:r>
+                  <a:rPr lang="en-US" dirty="0">
+                    <a:latin typeface="Tw Cen MT" panose="020B0602020104020603" pitchFamily="34" charset="0"/>
+                  </a:rPr>
+                  <a:t> the </a:t>
+                </a:r>
+                <a:r>
+                  <a:rPr lang="en-US" b="1" dirty="0">
+                    <a:latin typeface="Tw Cen MT" panose="020B0602020104020603" pitchFamily="34" charset="0"/>
+                  </a:rPr>
+                  <a:t>trajectory of </a:t>
+                </a:r>
+                <a:r>
+                  <a:rPr lang="en-US" dirty="0">
+                    <a:latin typeface="Tw Cen MT" panose="020B0602020104020603" pitchFamily="34" charset="0"/>
+                  </a:rPr>
+                  <a:t>a desired </a:t>
+                </a:r>
+                <a:r>
+                  <a:rPr lang="en-US" b="1" dirty="0">
+                    <a:latin typeface="Tw Cen MT" panose="020B0602020104020603" pitchFamily="34" charset="0"/>
+                  </a:rPr>
+                  <a:t>dependent parameter</a:t>
+                </a:r>
+                <a:r>
+                  <a:rPr lang="en-US" dirty="0">
+                    <a:latin typeface="Tw Cen MT" panose="020B0602020104020603" pitchFamily="34" charset="0"/>
+                  </a:rPr>
+                  <a:t>, such as:</a:t>
+                </a:r>
+              </a:p>
+              <a:p>
+                <a:pPr marL="742950" lvl="1" indent="-285750">
+                  <a:buFont typeface="Tw Cen MT" panose="020B0602020104020603" pitchFamily="34" charset="0"/>
+                  <a:buChar char="|"/>
+                </a:pPr>
+                <a:endParaRPr lang="en-US" dirty="0">
+                  <a:latin typeface="Tw Cen MT" panose="020B0602020104020603" pitchFamily="34" charset="0"/>
+                </a:endParaRPr>
+              </a:p>
+              <a:p>
+                <a:pPr marL="1200150" lvl="2" indent="-285750">
+                  <a:buFont typeface="Tw Cen MT" panose="020B0602020104020603" pitchFamily="34" charset="0"/>
+                  <a:buChar char="|"/>
+                </a:pPr>
+                <a:r>
+                  <a:rPr lang="en-US" dirty="0">
+                    <a:latin typeface="Tw Cen MT" panose="020B0602020104020603" pitchFamily="34" charset="0"/>
+                  </a:rPr>
+                  <a:t>A state variable (say, boundary voltage </a:t>
+                </a:r>
+                <a14:m>
+                  <m:oMath xmlns:m="http://schemas.openxmlformats.org/officeDocument/2006/math">
+                    <m:sSub>
+                      <m:sSubPr>
+                        <m:ctrlPr>
+                          <a:rPr lang="en-US" b="0" i="1" smtClean="0">
+                            <a:latin typeface="Cambria Math" panose="02040503050406030204" pitchFamily="18" charset="0"/>
+                          </a:rPr>
+                        </m:ctrlPr>
+                      </m:sSubPr>
+                      <m:e>
+                        <m:r>
+                          <a:rPr lang="en-US" b="0" i="1" smtClean="0">
+                            <a:latin typeface="Cambria Math" panose="02040503050406030204" pitchFamily="18" charset="0"/>
+                          </a:rPr>
+                          <m:t>𝑉</m:t>
+                        </m:r>
+                      </m:e>
+                      <m:sub>
+                        <m:d>
+                          <m:dPr>
+                            <m:begChr m:val="{"/>
+                            <m:endChr m:val="}"/>
+                            <m:ctrlPr>
+                              <a:rPr lang="en-US" b="0" i="1" smtClean="0">
+                                <a:latin typeface="Cambria Math" panose="02040503050406030204" pitchFamily="18" charset="0"/>
+                              </a:rPr>
+                            </m:ctrlPr>
+                          </m:dPr>
+                          <m:e>
+                            <m:r>
+                              <a:rPr lang="en-US" b="0" i="1" smtClean="0">
+                                <a:latin typeface="Cambria Math" panose="02040503050406030204" pitchFamily="18" charset="0"/>
+                              </a:rPr>
+                              <m:t>𝑖</m:t>
+                            </m:r>
+                            <m:r>
+                              <a:rPr lang="en-US" b="0" i="1" smtClean="0">
+                                <a:latin typeface="Cambria Math" panose="02040503050406030204" pitchFamily="18" charset="0"/>
+                              </a:rPr>
+                              <m:t> →</m:t>
+                            </m:r>
+                            <m:r>
+                              <a:rPr lang="en-US" b="0" i="1" smtClean="0">
+                                <a:latin typeface="Cambria Math" panose="02040503050406030204" pitchFamily="18" charset="0"/>
+                              </a:rPr>
+                              <m:t>𝑗</m:t>
+                            </m:r>
+                          </m:e>
+                        </m:d>
+                      </m:sub>
+                    </m:sSub>
+                  </m:oMath>
+                </a14:m>
+                <a:r>
+                  <a:rPr lang="en-US" dirty="0">
+                    <a:latin typeface="Tw Cen MT" panose="020B0602020104020603" pitchFamily="34" charset="0"/>
+                  </a:rPr>
+                  <a:t> or boundary </a:t>
+                </a:r>
+                <a:r>
+                  <a:rPr lang="en-US" dirty="0" err="1">
+                    <a:latin typeface="Tw Cen MT" panose="020B0602020104020603" pitchFamily="34" charset="0"/>
+                  </a:rPr>
+                  <a:t>powerflows</a:t>
+                </a:r>
+                <a:r>
+                  <a:rPr lang="en-US" dirty="0">
+                    <a:latin typeface="Tw Cen MT" panose="020B0602020104020603" pitchFamily="34" charset="0"/>
+                  </a:rPr>
+                  <a:t> </a:t>
+                </a:r>
+                <a14:m>
+                  <m:oMath xmlns:m="http://schemas.openxmlformats.org/officeDocument/2006/math">
+                    <m:sSub>
+                      <m:sSubPr>
+                        <m:ctrlPr>
+                          <a:rPr lang="en-US" b="0" i="1" smtClean="0">
+                            <a:latin typeface="Cambria Math" panose="02040503050406030204" pitchFamily="18" charset="0"/>
+                          </a:rPr>
+                        </m:ctrlPr>
+                      </m:sSubPr>
+                      <m:e>
+                        <m:r>
+                          <a:rPr lang="en-US" b="0" i="1" smtClean="0">
+                            <a:latin typeface="Cambria Math" panose="02040503050406030204" pitchFamily="18" charset="0"/>
+                          </a:rPr>
+                          <m:t>𝑆</m:t>
+                        </m:r>
+                      </m:e>
+                      <m:sub>
+                        <m:r>
+                          <a:rPr lang="en-US" b="0" i="1" smtClean="0">
+                            <a:latin typeface="Cambria Math" panose="02040503050406030204" pitchFamily="18" charset="0"/>
+                          </a:rPr>
+                          <m:t>𝑖𝑗</m:t>
+                        </m:r>
+                      </m:sub>
+                    </m:sSub>
+                    <m:r>
+                      <a:rPr lang="en-US" b="0" i="1" smtClean="0">
+                        <a:latin typeface="Cambria Math" panose="02040503050406030204" pitchFamily="18" charset="0"/>
+                      </a:rPr>
+                      <m:t>=</m:t>
+                    </m:r>
+                    <m:sSub>
+                      <m:sSubPr>
+                        <m:ctrlPr>
+                          <a:rPr lang="en-US" b="0" i="1" smtClean="0">
+                            <a:latin typeface="Cambria Math" panose="02040503050406030204" pitchFamily="18" charset="0"/>
+                          </a:rPr>
+                        </m:ctrlPr>
+                      </m:sSubPr>
+                      <m:e>
+                        <m:r>
+                          <a:rPr lang="en-US" b="0" i="1" smtClean="0">
+                            <a:latin typeface="Cambria Math" panose="02040503050406030204" pitchFamily="18" charset="0"/>
+                          </a:rPr>
+                          <m:t>𝑃</m:t>
+                        </m:r>
+                      </m:e>
+                      <m:sub>
+                        <m:r>
+                          <a:rPr lang="en-US" b="0" i="1" smtClean="0">
+                            <a:latin typeface="Cambria Math" panose="02040503050406030204" pitchFamily="18" charset="0"/>
+                          </a:rPr>
+                          <m:t>𝑖𝑗</m:t>
+                        </m:r>
+                      </m:sub>
+                    </m:sSub>
+                    <m:r>
+                      <a:rPr lang="en-US" b="0" i="1" smtClean="0">
+                        <a:latin typeface="Cambria Math" panose="02040503050406030204" pitchFamily="18" charset="0"/>
+                      </a:rPr>
+                      <m:t>+</m:t>
+                    </m:r>
+                    <m:r>
+                      <a:rPr lang="en-US" b="0" i="1" smtClean="0">
+                        <a:latin typeface="Cambria Math" panose="02040503050406030204" pitchFamily="18" charset="0"/>
+                      </a:rPr>
+                      <m:t>𝑗</m:t>
+                    </m:r>
+                    <m:sSub>
+                      <m:sSubPr>
+                        <m:ctrlPr>
+                          <a:rPr lang="en-US" b="0" i="1" smtClean="0">
+                            <a:latin typeface="Cambria Math" panose="02040503050406030204" pitchFamily="18" charset="0"/>
+                          </a:rPr>
+                        </m:ctrlPr>
+                      </m:sSubPr>
+                      <m:e>
+                        <m:r>
+                          <a:rPr lang="en-US" b="0" i="1" smtClean="0">
+                            <a:latin typeface="Cambria Math" panose="02040503050406030204" pitchFamily="18" charset="0"/>
+                          </a:rPr>
+                          <m:t>𝑄</m:t>
+                        </m:r>
+                      </m:e>
+                      <m:sub>
+                        <m:r>
+                          <a:rPr lang="en-US" b="0" i="1" smtClean="0">
+                            <a:latin typeface="Cambria Math" panose="02040503050406030204" pitchFamily="18" charset="0"/>
+                          </a:rPr>
+                          <m:t>𝑖𝑗</m:t>
+                        </m:r>
+                      </m:sub>
+                    </m:sSub>
+                  </m:oMath>
+                </a14:m>
+                <a:r>
+                  <a:rPr lang="en-US" dirty="0">
+                    <a:latin typeface="Tw Cen MT" panose="020B0602020104020603" pitchFamily="34" charset="0"/>
+                  </a:rPr>
+                  <a:t>)</a:t>
+                </a:r>
+              </a:p>
+              <a:p>
+                <a:pPr marL="1200150" lvl="2" indent="-285750">
+                  <a:buFont typeface="Tw Cen MT" panose="020B0602020104020603" pitchFamily="34" charset="0"/>
+                  <a:buChar char="|"/>
+                </a:pPr>
+                <a:r>
+                  <a:rPr lang="en-US" dirty="0">
+                    <a:latin typeface="Tw Cen MT" panose="020B0602020104020603" pitchFamily="34" charset="0"/>
+                  </a:rPr>
+                  <a:t>A control variable (say, sum of inverter reactive power outputs at all DER locations </a:t>
+                </a:r>
+                <a14:m>
+                  <m:oMath xmlns:m="http://schemas.openxmlformats.org/officeDocument/2006/math">
+                    <m:sSub>
+                      <m:sSubPr>
+                        <m:ctrlPr>
+                          <a:rPr lang="en-US" b="0" i="1" smtClean="0">
+                            <a:latin typeface="Cambria Math" panose="02040503050406030204" pitchFamily="18" charset="0"/>
+                          </a:rPr>
+                        </m:ctrlPr>
+                      </m:sSubPr>
+                      <m:e>
+                        <m:r>
+                          <a:rPr lang="en-US" b="0" i="1" smtClean="0">
+                            <a:latin typeface="Cambria Math" panose="02040503050406030204" pitchFamily="18" charset="0"/>
+                          </a:rPr>
+                          <m:t>𝑄</m:t>
+                        </m:r>
+                      </m:e>
+                      <m:sub>
+                        <m:r>
+                          <a:rPr lang="en-US" b="0" i="1" smtClean="0">
+                            <a:latin typeface="Cambria Math" panose="02040503050406030204" pitchFamily="18" charset="0"/>
+                          </a:rPr>
+                          <m:t>𝐷𝐸𝑅</m:t>
+                        </m:r>
+                      </m:sub>
+                    </m:sSub>
+                  </m:oMath>
+                </a14:m>
+                <a:r>
+                  <a:rPr lang="en-US" dirty="0">
+                    <a:latin typeface="Tw Cen MT" panose="020B0602020104020603" pitchFamily="34" charset="0"/>
+                  </a:rPr>
+                  <a:t>)</a:t>
+                </a:r>
+              </a:p>
+              <a:p>
+                <a:pPr marL="1200150" lvl="2" indent="-285750">
+                  <a:buFont typeface="Tw Cen MT" panose="020B0602020104020603" pitchFamily="34" charset="0"/>
+                  <a:buChar char="|"/>
+                </a:pPr>
+                <a:r>
+                  <a:rPr lang="en-US" dirty="0">
+                    <a:latin typeface="Tw Cen MT" panose="020B0602020104020603" pitchFamily="34" charset="0"/>
+                  </a:rPr>
+                  <a:t>An output variable (say, system line losses </a:t>
+                </a:r>
+                <a14:m>
+                  <m:oMath xmlns:m="http://schemas.openxmlformats.org/officeDocument/2006/math">
+                    <m:sSub>
+                      <m:sSubPr>
+                        <m:ctrlPr>
+                          <a:rPr lang="en-US" b="0" i="1" smtClean="0">
+                            <a:latin typeface="Cambria Math" panose="02040503050406030204" pitchFamily="18" charset="0"/>
+                          </a:rPr>
+                        </m:ctrlPr>
+                      </m:sSubPr>
+                      <m:e>
+                        <m:r>
+                          <a:rPr lang="en-US" b="0" i="1" smtClean="0">
+                            <a:latin typeface="Cambria Math" panose="02040503050406030204" pitchFamily="18" charset="0"/>
+                          </a:rPr>
+                          <m:t>𝑃</m:t>
+                        </m:r>
+                      </m:e>
+                      <m:sub>
+                        <m:r>
+                          <a:rPr lang="en-US" b="0" i="1" smtClean="0">
+                            <a:latin typeface="Cambria Math" panose="02040503050406030204" pitchFamily="18" charset="0"/>
+                          </a:rPr>
+                          <m:t>𝐿𝑜𝑠𝑠</m:t>
+                        </m:r>
+                      </m:sub>
+                    </m:sSub>
+                  </m:oMath>
+                </a14:m>
+                <a:r>
+                  <a:rPr lang="en-US" dirty="0">
+                    <a:latin typeface="Tw Cen MT" panose="020B0602020104020603" pitchFamily="34" charset="0"/>
+                  </a:rPr>
+                  <a:t> or </a:t>
+                </a:r>
+                <a:r>
+                  <a:rPr lang="en-US">
+                    <a:latin typeface="Tw Cen MT" panose="020B0602020104020603" pitchFamily="34" charset="0"/>
+                  </a:rPr>
+                  <a:t>system total voltage </a:t>
+                </a:r>
+                <a:r>
+                  <a:rPr lang="en-US" dirty="0">
+                    <a:latin typeface="Tw Cen MT" panose="020B0602020104020603" pitchFamily="34" charset="0"/>
+                  </a:rPr>
+                  <a:t>deviations </a:t>
+                </a:r>
+                <a14:m>
+                  <m:oMath xmlns:m="http://schemas.openxmlformats.org/officeDocument/2006/math">
+                    <m:r>
+                      <m:rPr>
+                        <m:sty m:val="p"/>
+                      </m:rPr>
+                      <a:rPr lang="en-US" b="0" i="0" smtClean="0">
+                        <a:latin typeface="Cambria Math" panose="02040503050406030204" pitchFamily="18" charset="0"/>
+                      </a:rPr>
+                      <m:t>Δ</m:t>
+                    </m:r>
+                    <m:r>
+                      <a:rPr lang="en-US" b="0" i="1" smtClean="0">
+                        <a:latin typeface="Cambria Math" panose="02040503050406030204" pitchFamily="18" charset="0"/>
+                      </a:rPr>
+                      <m:t>𝑉</m:t>
+                    </m:r>
+                  </m:oMath>
+                </a14:m>
+                <a:r>
+                  <a:rPr lang="en-US" dirty="0">
+                    <a:latin typeface="Tw Cen MT" panose="020B0602020104020603" pitchFamily="34" charset="0"/>
+                  </a:rPr>
+                  <a:t>) .</a:t>
+                </a:r>
+              </a:p>
+              <a:p>
+                <a:pPr lvl="1"/>
+                <a:endParaRPr lang="en-US" dirty="0">
+                  <a:latin typeface="Tw Cen MT" panose="020B0602020104020603" pitchFamily="34" charset="0"/>
+                </a:endParaRPr>
+              </a:p>
+              <a:p>
+                <a:pPr lvl="1"/>
+                <a:endParaRPr lang="en-US" dirty="0">
+                  <a:latin typeface="Tw Cen MT" panose="020B0602020104020603" pitchFamily="34" charset="0"/>
+                </a:endParaRPr>
+              </a:p>
+              <a:p>
+                <a:pPr lvl="1"/>
+                <a:r>
+                  <a:rPr lang="en-US" dirty="0">
+                    <a:latin typeface="Tw Cen MT" panose="020B0602020104020603" pitchFamily="34" charset="0"/>
+                  </a:rPr>
+                  <a:t>							</a:t>
+                </a:r>
+                <a:br>
+                  <a:rPr lang="en-US" dirty="0"/>
+                </a:br>
+                <a:endParaRPr lang="en-US" dirty="0"/>
+              </a:p>
+            </p:txBody>
+          </p:sp>
+        </mc:Choice>
+        <mc:Fallback>
+          <p:sp>
+            <p:nvSpPr>
+              <p:cNvPr id="16" name="TextBox 15">
+                <a:extLst>
+                  <a:ext uri="{FF2B5EF4-FFF2-40B4-BE49-F238E27FC236}">
+                    <a16:creationId xmlns:a16="http://schemas.microsoft.com/office/drawing/2014/main" id="{63991ACF-C27F-7188-A451-B28D3C2ED4A6}"/>
+                  </a:ext>
+                </a:extLst>
+              </p:cNvPr>
+              <p:cNvSpPr txBox="1">
+                <a:spLocks noRot="1" noChangeAspect="1" noMove="1" noResize="1" noEditPoints="1" noAdjustHandles="1" noChangeArrowheads="1" noChangeShapeType="1" noTextEdit="1"/>
+              </p:cNvSpPr>
+              <p:nvPr/>
+            </p:nvSpPr>
+            <p:spPr>
+              <a:xfrm>
+                <a:off x="1363436" y="2335728"/>
+                <a:ext cx="9939564" cy="5078313"/>
+              </a:xfrm>
+              <a:prstGeom prst="rect">
+                <a:avLst/>
+              </a:prstGeom>
+              <a:blipFill>
+                <a:blip r:embed="rId2"/>
+                <a:stretch>
+                  <a:fillRect l="-552" t="-600" r="-307"/>
+                </a:stretch>
+              </a:blipFill>
+            </p:spPr>
+            <p:txBody>
+              <a:bodyPr/>
+              <a:lstStyle/>
+              <a:p>
+                <a:r>
+                  <a:rPr lang="en-US">
+                    <a:noFill/>
+                  </a:rPr>
+                  <a:t> </a:t>
+                </a:r>
+              </a:p>
+            </p:txBody>
+          </p:sp>
+        </mc:Fallback>
+      </mc:AlternateContent>
       <p:grpSp>
         <p:nvGrpSpPr>
-          <p:cNvPr id="3" name="Group 2">
+          <p:cNvPr id="20" name="Group 19">
             <a:extLst>
               <a:ext uri="{FF2B5EF4-FFF2-40B4-BE49-F238E27FC236}">
-                <a16:creationId xmlns:a16="http://schemas.microsoft.com/office/drawing/2014/main" id="{C2895B56-73D7-814B-8B10-701AA4AB75AF}"/>
+                <a16:creationId xmlns:a16="http://schemas.microsoft.com/office/drawing/2014/main" id="{60BFAD4F-3526-3206-C424-7C5B1F0F6FB7}"/>
+              </a:ext>
+            </a:extLst>
+          </p:cNvPr>
+          <p:cNvGrpSpPr/>
+          <p:nvPr/>
+        </p:nvGrpSpPr>
+        <p:grpSpPr>
+          <a:xfrm>
+            <a:off x="8084062" y="136525"/>
+            <a:ext cx="2881146" cy="2108986"/>
+            <a:chOff x="8084062" y="136525"/>
+            <a:chExt cx="2881146" cy="2108986"/>
+          </a:xfrm>
+        </p:grpSpPr>
+        <p:pic>
+          <p:nvPicPr>
+            <p:cNvPr id="18" name="Picture 17">
+              <a:extLst>
+                <a:ext uri="{FF2B5EF4-FFF2-40B4-BE49-F238E27FC236}">
+                  <a16:creationId xmlns:a16="http://schemas.microsoft.com/office/drawing/2014/main" id="{1C980944-026F-5C5F-7384-2FD76A0F489C}"/>
+                </a:ext>
+              </a:extLst>
+            </p:cNvPr>
+            <p:cNvPicPr>
+              <a:picLocks noChangeAspect="1"/>
+            </p:cNvPicPr>
+            <p:nvPr/>
+          </p:nvPicPr>
+          <p:blipFill>
+            <a:blip r:embed="rId3"/>
+            <a:stretch>
+              <a:fillRect/>
+            </a:stretch>
+          </p:blipFill>
+          <p:spPr>
+            <a:xfrm>
+              <a:off x="8084062" y="136525"/>
+              <a:ext cx="2881146" cy="1801209"/>
+            </a:xfrm>
+            <a:prstGeom prst="rect">
+              <a:avLst/>
+            </a:prstGeom>
+          </p:spPr>
+        </p:pic>
+        <p:sp>
+          <p:nvSpPr>
+            <p:cNvPr id="19" name="TextBox 18">
+              <a:extLst>
+                <a:ext uri="{FF2B5EF4-FFF2-40B4-BE49-F238E27FC236}">
+                  <a16:creationId xmlns:a16="http://schemas.microsoft.com/office/drawing/2014/main" id="{6BCCF6CA-B34E-A367-CCBA-3B4185ABBF22}"/>
+                </a:ext>
+              </a:extLst>
+            </p:cNvPr>
+            <p:cNvSpPr txBox="1"/>
+            <p:nvPr/>
+          </p:nvSpPr>
+          <p:spPr>
+            <a:xfrm>
+              <a:off x="8084062" y="1937734"/>
+              <a:ext cx="2881146" cy="307777"/>
+            </a:xfrm>
+            <a:prstGeom prst="rect">
+              <a:avLst/>
+            </a:prstGeom>
+            <a:noFill/>
+          </p:spPr>
+          <p:txBody>
+            <a:bodyPr wrap="square" rtlCol="0">
+              <a:spAutoFit/>
+            </a:bodyPr>
+            <a:lstStyle/>
+            <a:p>
+              <a:pPr algn="ctr"/>
+              <a:r>
+                <a:rPr lang="en-US" sz="1400" dirty="0">
+                  <a:latin typeface="Tw Cen MT" panose="020B0602020104020603" pitchFamily="34" charset="0"/>
+                </a:rPr>
+                <a:t>Synthetic 10k Distribution Network</a:t>
+              </a:r>
+            </a:p>
+          </p:txBody>
+        </p:sp>
+      </p:grpSp>
+      <p:grpSp>
+        <p:nvGrpSpPr>
+          <p:cNvPr id="21" name="Group 20">
+            <a:extLst>
+              <a:ext uri="{FF2B5EF4-FFF2-40B4-BE49-F238E27FC236}">
+                <a16:creationId xmlns:a16="http://schemas.microsoft.com/office/drawing/2014/main" id="{F38E01B3-56AD-6626-1B6B-419128D70B0B}"/>
               </a:ext>
             </a:extLst>
           </p:cNvPr>
@@ -5818,18 +6787,18 @@
         <p:grpSpPr>
           <a:xfrm>
             <a:off x="0" y="0"/>
-            <a:ext cx="731706" cy="584776"/>
+            <a:ext cx="731706" cy="541243"/>
             <a:chOff x="1782895" y="1047749"/>
-            <a:chExt cx="731706" cy="584776"/>
+            <a:chExt cx="731706" cy="541243"/>
           </a:xfrm>
         </p:grpSpPr>
         <p:sp>
           <p:nvSpPr>
-            <p:cNvPr id="4" name="Rectangle: Top Corners Rounded 3">
-              <a:hlinkClick r:id="rId2" action="ppaction://hlinksldjump"/>
+            <p:cNvPr id="22" name="Rectangle: Top Corners Rounded 21">
+              <a:hlinkClick r:id="rId4" action="ppaction://hlinksldjump"/>
               <a:extLst>
                 <a:ext uri="{FF2B5EF4-FFF2-40B4-BE49-F238E27FC236}">
-                  <a16:creationId xmlns:a16="http://schemas.microsoft.com/office/drawing/2014/main" id="{39C71656-BFBE-2976-31C1-3D9020167F7F}"/>
+                  <a16:creationId xmlns:a16="http://schemas.microsoft.com/office/drawing/2014/main" id="{63CA5B54-C164-C04F-03EE-FE168455F14E}"/>
                 </a:ext>
               </a:extLst>
             </p:cNvPr>
@@ -5884,10 +6853,10 @@
         </p:sp>
         <p:sp>
           <p:nvSpPr>
-            <p:cNvPr id="5" name="TextBox 4">
+            <p:cNvPr id="23" name="TextBox 22">
               <a:extLst>
                 <a:ext uri="{FF2B5EF4-FFF2-40B4-BE49-F238E27FC236}">
-                  <a16:creationId xmlns:a16="http://schemas.microsoft.com/office/drawing/2014/main" id="{AA610199-DB78-7E01-B65D-881372A697BF}"/>
+                  <a16:creationId xmlns:a16="http://schemas.microsoft.com/office/drawing/2014/main" id="{79C98084-0850-DB2B-624F-DA651B3501A6}"/>
                 </a:ext>
               </a:extLst>
             </p:cNvPr>
@@ -5896,8 +6865,8 @@
           </p:nvSpPr>
           <p:spPr>
             <a:xfrm>
-              <a:off x="1937895" y="1047750"/>
-              <a:ext cx="386206" cy="584775"/>
+              <a:off x="1864298" y="1157528"/>
+              <a:ext cx="533400" cy="307777"/>
             </a:xfrm>
             <a:prstGeom prst="rect">
               <a:avLst/>
@@ -5915,13 +6884,13 @@
             <a:p>
               <a:pPr algn="ctr"/>
               <a:r>
-                <a:rPr lang="en-US" sz="3200" b="1" dirty="0">
+                <a:rPr lang="en-US" sz="1400" b="1" dirty="0">
                   <a:solidFill>
                     <a:schemeClr val="bg1"/>
                   </a:solidFill>
                   <a:latin typeface="DAGGERSQUARE" pitchFamily="50" charset="0"/>
                 </a:rPr>
-                <a:t>D</a:t>
+                <a:t>Prob</a:t>
               </a:r>
             </a:p>
           </p:txBody>
@@ -5929,10 +6898,10 @@
       </p:grpSp>
       <p:grpSp>
         <p:nvGrpSpPr>
-          <p:cNvPr id="6" name="Group 5">
+          <p:cNvPr id="24" name="Group 23">
             <a:extLst>
               <a:ext uri="{FF2B5EF4-FFF2-40B4-BE49-F238E27FC236}">
-                <a16:creationId xmlns:a16="http://schemas.microsoft.com/office/drawing/2014/main" id="{913CC6DF-03C3-3BD8-0374-C0352FBAB705}"/>
+                <a16:creationId xmlns:a16="http://schemas.microsoft.com/office/drawing/2014/main" id="{9DDEF095-B052-7B61-49F1-0AD58E757BE4}"/>
               </a:ext>
             </a:extLst>
           </p:cNvPr>
@@ -5949,11 +6918,11 @@
         </p:grpSpPr>
         <p:sp>
           <p:nvSpPr>
-            <p:cNvPr id="7" name="Rectangle: Top Corners Rounded 6">
-              <a:hlinkClick r:id="rId3" action="ppaction://hlinksldjump"/>
+            <p:cNvPr id="25" name="Rectangle: Top Corners Rounded 24">
+              <a:hlinkClick r:id="rId5" action="ppaction://hlinksldjump"/>
               <a:extLst>
                 <a:ext uri="{FF2B5EF4-FFF2-40B4-BE49-F238E27FC236}">
-                  <a16:creationId xmlns:a16="http://schemas.microsoft.com/office/drawing/2014/main" id="{B3D4595E-644D-FC0E-44F8-77BB092AEB36}"/>
+                  <a16:creationId xmlns:a16="http://schemas.microsoft.com/office/drawing/2014/main" id="{DF26108A-8943-9514-2DFE-E8B0C658128A}"/>
                 </a:ext>
               </a:extLst>
             </p:cNvPr>
@@ -6008,10 +6977,10 @@
         </p:sp>
         <p:sp>
           <p:nvSpPr>
-            <p:cNvPr id="8" name="TextBox 7">
+            <p:cNvPr id="26" name="TextBox 25">
               <a:extLst>
                 <a:ext uri="{FF2B5EF4-FFF2-40B4-BE49-F238E27FC236}">
-                  <a16:creationId xmlns:a16="http://schemas.microsoft.com/office/drawing/2014/main" id="{42FE18C4-F67B-0EC4-EC98-791D923FDDD1}"/>
+                  <a16:creationId xmlns:a16="http://schemas.microsoft.com/office/drawing/2014/main" id="{FD22E970-3933-7892-6A82-76AA057C52CD}"/>
                 </a:ext>
               </a:extLst>
             </p:cNvPr>
@@ -6053,10 +7022,10 @@
       </p:grpSp>
       <p:grpSp>
         <p:nvGrpSpPr>
-          <p:cNvPr id="9" name="Group 8">
+          <p:cNvPr id="27" name="Group 26">
             <a:extLst>
               <a:ext uri="{FF2B5EF4-FFF2-40B4-BE49-F238E27FC236}">
-                <a16:creationId xmlns:a16="http://schemas.microsoft.com/office/drawing/2014/main" id="{6588709F-D075-4438-19F3-9758A9489D68}"/>
+                <a16:creationId xmlns:a16="http://schemas.microsoft.com/office/drawing/2014/main" id="{8F26E5BF-5545-E1B0-BE06-8206AC874C9E}"/>
               </a:ext>
             </a:extLst>
           </p:cNvPr>
@@ -6073,11 +7042,11 @@
         </p:grpSpPr>
         <p:sp>
           <p:nvSpPr>
-            <p:cNvPr id="10" name="Rectangle: Top Corners Rounded 9">
-              <a:hlinkClick r:id="rId4" action="ppaction://hlinksldjump"/>
+            <p:cNvPr id="28" name="Rectangle: Top Corners Rounded 27">
+              <a:hlinkClick r:id="rId6" action="ppaction://hlinksldjump"/>
               <a:extLst>
                 <a:ext uri="{FF2B5EF4-FFF2-40B4-BE49-F238E27FC236}">
-                  <a16:creationId xmlns:a16="http://schemas.microsoft.com/office/drawing/2014/main" id="{3B534F23-C88F-9BAB-ED29-7F3FF153CD35}"/>
+                  <a16:creationId xmlns:a16="http://schemas.microsoft.com/office/drawing/2014/main" id="{1FACBE21-2BC8-4D5B-DA6F-18A6CA0E3C31}"/>
                 </a:ext>
               </a:extLst>
             </p:cNvPr>
@@ -6132,10 +7101,10 @@
         </p:sp>
         <p:sp>
           <p:nvSpPr>
-            <p:cNvPr id="11" name="TextBox 10">
+            <p:cNvPr id="29" name="TextBox 28">
               <a:extLst>
                 <a:ext uri="{FF2B5EF4-FFF2-40B4-BE49-F238E27FC236}">
-                  <a16:creationId xmlns:a16="http://schemas.microsoft.com/office/drawing/2014/main" id="{2F647018-3D66-B8CC-5317-60DF591B646F}"/>
+                  <a16:creationId xmlns:a16="http://schemas.microsoft.com/office/drawing/2014/main" id="{91ECE067-7910-A4D5-6BDE-DD3808E50C3E}"/>
                 </a:ext>
               </a:extLst>
             </p:cNvPr>
@@ -6177,10 +7146,10 @@
       </p:grpSp>
       <p:grpSp>
         <p:nvGrpSpPr>
-          <p:cNvPr id="12" name="Group 11">
+          <p:cNvPr id="30" name="Group 29">
             <a:extLst>
               <a:ext uri="{FF2B5EF4-FFF2-40B4-BE49-F238E27FC236}">
-                <a16:creationId xmlns:a16="http://schemas.microsoft.com/office/drawing/2014/main" id="{817A9E87-B46D-F4D7-617E-8EFD39216579}"/>
+                <a16:creationId xmlns:a16="http://schemas.microsoft.com/office/drawing/2014/main" id="{318719A0-5300-3D9A-0491-61BF2040D1C9}"/>
               </a:ext>
             </a:extLst>
           </p:cNvPr>
@@ -6197,11 +7166,11 @@
         </p:grpSpPr>
         <p:sp>
           <p:nvSpPr>
-            <p:cNvPr id="13" name="Rectangle: Top Corners Rounded 12">
-              <a:hlinkClick r:id="rId5" action="ppaction://hlinksldjump"/>
+            <p:cNvPr id="31" name="Rectangle: Top Corners Rounded 30">
+              <a:hlinkClick r:id="rId7" action="ppaction://hlinksldjump"/>
               <a:extLst>
                 <a:ext uri="{FF2B5EF4-FFF2-40B4-BE49-F238E27FC236}">
-                  <a16:creationId xmlns:a16="http://schemas.microsoft.com/office/drawing/2014/main" id="{F6BCF5FA-46CC-AAF1-D6A1-41FBD12DB251}"/>
+                  <a16:creationId xmlns:a16="http://schemas.microsoft.com/office/drawing/2014/main" id="{D5B596BD-B6B1-BE54-F24C-611444701E4F}"/>
                 </a:ext>
               </a:extLst>
             </p:cNvPr>
@@ -6256,10 +7225,10 @@
         </p:sp>
         <p:sp>
           <p:nvSpPr>
-            <p:cNvPr id="14" name="TextBox 13">
+            <p:cNvPr id="32" name="TextBox 31">
               <a:extLst>
                 <a:ext uri="{FF2B5EF4-FFF2-40B4-BE49-F238E27FC236}">
-                  <a16:creationId xmlns:a16="http://schemas.microsoft.com/office/drawing/2014/main" id="{B43505AE-7A89-5CCE-3B09-E5A06F4F11E1}"/>
+                  <a16:creationId xmlns:a16="http://schemas.microsoft.com/office/drawing/2014/main" id="{437E8111-CAE1-3230-FF6C-2C8256475FF7}"/>
                 </a:ext>
               </a:extLst>
             </p:cNvPr>

</xml_diff>